<commit_message>
Project instruction into pdf
</commit_message>
<xml_diff>
--- a/slides/2024/slides_20241210.pptx
+++ b/slides/2024/slides_20241210.pptx
@@ -26734,8 +26734,18 @@
           </a:p>
           <a:p>
             <a:r>
-              <a:rPr lang="en-US" sz="1400" dirty="0"/>
-              <a:t>Correction:</a:t>
+              <a:rPr lang="en-US" sz="1400"/>
+              <a:t>Correction: </a:t>
+            </a:r>
+            <a:r>
+              <a:rPr lang="en-US" sz="1400">
+                <a:hlinkClick r:id="rId3"/>
+              </a:rPr>
+              <a:t>https://github.com/AlexandreHugoMathieu/pvfault_detection_solar_academy/blob/master/notebooks/iv_curve_modeling.ipynb</a:t>
+            </a:r>
+            <a:r>
+              <a:rPr lang="en-US" sz="1400"/>
+              <a:t> </a:t>
             </a:r>
             <a:endParaRPr lang="en-US" sz="1400" b="1" dirty="0">
               <a:latin typeface="+mn-lt"/>
@@ -27146,7 +27156,7 @@
               <a:t>Individual</a:t>
             </a:r>
             <a:r>
-              <a:rPr lang="fr-FR"/>
+              <a:rPr lang="fr-FR" dirty="0"/>
               <a:t> Project</a:t>
             </a:r>
             <a:endParaRPr lang="en-US" dirty="0"/>

</xml_diff>